<commit_message>
fixes merge conflicts with solution branch
</commit_message>
<xml_diff>
--- a/Study Staurday - w3.pptx
+++ b/Study Staurday - w3.pptx
@@ -262,7 +262,7 @@
           <a:p>
             <a:fld id="{00662177-2CA0-4843-8C19-73F5643914DD}" type="datetimeFigureOut">
               <a:rPr lang="en-US" smtClean="0"/>
-              <a:t>9/26/18</a:t>
+              <a:t>10/9/18</a:t>
             </a:fld>
             <a:endParaRPr lang="en-US"/>
           </a:p>
@@ -460,7 +460,7 @@
           <a:p>
             <a:fld id="{00662177-2CA0-4843-8C19-73F5643914DD}" type="datetimeFigureOut">
               <a:rPr lang="en-US" smtClean="0"/>
-              <a:t>9/26/18</a:t>
+              <a:t>10/9/18</a:t>
             </a:fld>
             <a:endParaRPr lang="en-US"/>
           </a:p>
@@ -668,7 +668,7 @@
           <a:p>
             <a:fld id="{00662177-2CA0-4843-8C19-73F5643914DD}" type="datetimeFigureOut">
               <a:rPr lang="en-US" smtClean="0"/>
-              <a:t>9/26/18</a:t>
+              <a:t>10/9/18</a:t>
             </a:fld>
             <a:endParaRPr lang="en-US"/>
           </a:p>
@@ -866,7 +866,7 @@
           <a:p>
             <a:fld id="{00662177-2CA0-4843-8C19-73F5643914DD}" type="datetimeFigureOut">
               <a:rPr lang="en-US" smtClean="0"/>
-              <a:t>9/26/18</a:t>
+              <a:t>10/9/18</a:t>
             </a:fld>
             <a:endParaRPr lang="en-US"/>
           </a:p>
@@ -1141,7 +1141,7 @@
           <a:p>
             <a:fld id="{00662177-2CA0-4843-8C19-73F5643914DD}" type="datetimeFigureOut">
               <a:rPr lang="en-US" smtClean="0"/>
-              <a:t>9/26/18</a:t>
+              <a:t>10/9/18</a:t>
             </a:fld>
             <a:endParaRPr lang="en-US"/>
           </a:p>
@@ -1406,7 +1406,7 @@
           <a:p>
             <a:fld id="{00662177-2CA0-4843-8C19-73F5643914DD}" type="datetimeFigureOut">
               <a:rPr lang="en-US" smtClean="0"/>
-              <a:t>9/26/18</a:t>
+              <a:t>10/9/18</a:t>
             </a:fld>
             <a:endParaRPr lang="en-US"/>
           </a:p>
@@ -1818,7 +1818,7 @@
           <a:p>
             <a:fld id="{00662177-2CA0-4843-8C19-73F5643914DD}" type="datetimeFigureOut">
               <a:rPr lang="en-US" smtClean="0"/>
-              <a:t>9/26/18</a:t>
+              <a:t>10/9/18</a:t>
             </a:fld>
             <a:endParaRPr lang="en-US"/>
           </a:p>
@@ -1959,7 +1959,7 @@
           <a:p>
             <a:fld id="{00662177-2CA0-4843-8C19-73F5643914DD}" type="datetimeFigureOut">
               <a:rPr lang="en-US" smtClean="0"/>
-              <a:t>9/26/18</a:t>
+              <a:t>10/9/18</a:t>
             </a:fld>
             <a:endParaRPr lang="en-US"/>
           </a:p>
@@ -2072,7 +2072,7 @@
           <a:p>
             <a:fld id="{00662177-2CA0-4843-8C19-73F5643914DD}" type="datetimeFigureOut">
               <a:rPr lang="en-US" smtClean="0"/>
-              <a:t>9/26/18</a:t>
+              <a:t>10/9/18</a:t>
             </a:fld>
             <a:endParaRPr lang="en-US"/>
           </a:p>
@@ -2383,7 +2383,7 @@
           <a:p>
             <a:fld id="{00662177-2CA0-4843-8C19-73F5643914DD}" type="datetimeFigureOut">
               <a:rPr lang="en-US" smtClean="0"/>
-              <a:t>9/26/18</a:t>
+              <a:t>10/9/18</a:t>
             </a:fld>
             <a:endParaRPr lang="en-US"/>
           </a:p>
@@ -2671,7 +2671,7 @@
           <a:p>
             <a:fld id="{00662177-2CA0-4843-8C19-73F5643914DD}" type="datetimeFigureOut">
               <a:rPr lang="en-US" smtClean="0"/>
-              <a:t>9/26/18</a:t>
+              <a:t>10/9/18</a:t>
             </a:fld>
             <a:endParaRPr lang="en-US"/>
           </a:p>
@@ -2912,7 +2912,7 @@
           <a:p>
             <a:fld id="{00662177-2CA0-4843-8C19-73F5643914DD}" type="datetimeFigureOut">
               <a:rPr lang="en-US" smtClean="0"/>
-              <a:t>9/26/18</a:t>
+              <a:t>10/9/18</a:t>
             </a:fld>
             <a:endParaRPr lang="en-US"/>
           </a:p>
@@ -3596,7 +3596,12 @@
             <p:ph type="title"/>
           </p:nvPr>
         </p:nvSpPr>
-        <p:spPr/>
+        <p:spPr>
+          <a:xfrm>
+            <a:off x="838200" y="365126"/>
+            <a:ext cx="10515600" cy="868252"/>
+          </a:xfrm>
+        </p:spPr>
         <p:txBody>
           <a:bodyPr/>
           <a:lstStyle/>
@@ -3626,8 +3631,8 @@
         </p:nvSpPr>
         <p:spPr>
           <a:xfrm>
-            <a:off x="838200" y="1690689"/>
-            <a:ext cx="10515600" cy="4486274"/>
+            <a:off x="838200" y="2371726"/>
+            <a:ext cx="10515600" cy="4209827"/>
           </a:xfrm>
         </p:spPr>
         <p:txBody>
@@ -3642,7 +3647,74 @@
             </a:pPr>
             <a:r>
               <a:rPr lang="en-US" dirty="0"/>
-              <a:t>Starting point: git checkout cycle-1</a:t>
+              <a:t>To start  checkout cycle-1 branch: </a:t>
+            </a:r>
+            <a:r>
+              <a:rPr lang="en-US" i="1" dirty="0"/>
+              <a:t>git checkout cycle-1</a:t>
+            </a:r>
+          </a:p>
+          <a:p>
+            <a:pPr marL="0" indent="0">
+              <a:buNone/>
+            </a:pPr>
+            <a:r>
+              <a:rPr lang="en-US" i="1" dirty="0"/>
+              <a:t>Instructions:</a:t>
+            </a:r>
+          </a:p>
+          <a:p>
+            <a:pPr lvl="1">
+              <a:buFont typeface="Wingdings" pitchFamily="2" charset="2"/>
+              <a:buChar char="Ø"/>
+            </a:pPr>
+            <a:r>
+              <a:rPr lang="en-US" dirty="0"/>
+              <a:t>In browser/ </a:t>
+            </a:r>
+            <a:r>
+              <a:rPr lang="en-US" dirty="0" err="1"/>
+              <a:t>index.js</a:t>
+            </a:r>
+            <a:endParaRPr lang="en-US" dirty="0"/>
+          </a:p>
+          <a:p>
+            <a:pPr lvl="2">
+              <a:buFont typeface="Wingdings" pitchFamily="2" charset="2"/>
+              <a:buChar char="Ø"/>
+            </a:pPr>
+            <a:r>
+              <a:rPr lang="en-US" dirty="0"/>
+              <a:t> import `React` and `</a:t>
+            </a:r>
+            <a:r>
+              <a:rPr lang="en-US" dirty="0" err="1"/>
+              <a:t>ReactDOM</a:t>
+            </a:r>
+            <a:r>
+              <a:rPr lang="en-US" dirty="0"/>
+              <a:t>` and use the latter to render a heading that says “Hello React!”</a:t>
+            </a:r>
+            <a:endParaRPr lang="en-US" sz="2400" dirty="0"/>
+          </a:p>
+          <a:p>
+            <a:pPr lvl="1">
+              <a:buFont typeface="Wingdings" pitchFamily="2" charset="2"/>
+              <a:buChar char="Ø"/>
+            </a:pPr>
+            <a:r>
+              <a:rPr lang="en-US" dirty="0"/>
+              <a:t>Create a components folder in the browser folder.</a:t>
+            </a:r>
+          </a:p>
+          <a:p>
+            <a:pPr lvl="1">
+              <a:buFont typeface="Wingdings" pitchFamily="2" charset="2"/>
+              <a:buChar char="Ø"/>
+            </a:pPr>
+            <a:r>
+              <a:rPr lang="en-US" dirty="0"/>
+              <a:t>In that new components folder, create a &lt;Main&gt; component that fetches a list of all students from the server. It should render a table of students with one column, the student’s full name</a:t>
             </a:r>
           </a:p>
           <a:p>
@@ -3652,61 +3724,246 @@
             </a:pPr>
             <a:r>
               <a:rPr lang="en-US" dirty="0"/>
-              <a:t>In browser/ </a:t>
-            </a:r>
-            <a:r>
-              <a:rPr lang="en-US" dirty="0" err="1"/>
-              <a:t>index.js</a:t>
-            </a:r>
-            <a:endParaRPr lang="en-US" dirty="0"/>
-          </a:p>
-          <a:p>
-            <a:pPr lvl="1">
-              <a:buFont typeface="Wingdings" pitchFamily="2" charset="2"/>
-              <a:buChar char="Ø"/>
+              <a:t>Review at 12:00pm</a:t>
+            </a:r>
+          </a:p>
+        </p:txBody>
+      </p:sp>
+      <p:pic>
+        <p:nvPicPr>
+          <p:cNvPr id="5" name="Picture 4">
+            <a:extLst>
+              <a:ext uri="{FF2B5EF4-FFF2-40B4-BE49-F238E27FC236}">
+                <a16:creationId xmlns:a16="http://schemas.microsoft.com/office/drawing/2014/main" id="{EB2A95CF-E4EE-4D47-9006-76E2C6BEE752}"/>
+              </a:ext>
+            </a:extLst>
+          </p:cNvPr>
+          <p:cNvPicPr>
+            <a:picLocks noChangeAspect="1"/>
+          </p:cNvPicPr>
+          <p:nvPr/>
+        </p:nvPicPr>
+        <p:blipFill rotWithShape="1">
+          <a:blip r:embed="rId2"/>
+          <a:srcRect r="23130" b="8230"/>
+          <a:stretch/>
+        </p:blipFill>
+        <p:spPr>
+          <a:xfrm>
+            <a:off x="9478005" y="611614"/>
+            <a:ext cx="1866937" cy="2567521"/>
+          </a:xfrm>
+          <a:prstGeom prst="rect">
+            <a:avLst/>
+          </a:prstGeom>
+          <a:ln w="28575">
+            <a:solidFill>
+              <a:schemeClr val="accent1">
+                <a:lumMod val="60000"/>
+                <a:lumOff val="40000"/>
+              </a:schemeClr>
+            </a:solidFill>
+          </a:ln>
+        </p:spPr>
+      </p:pic>
+      <p:sp>
+        <p:nvSpPr>
+          <p:cNvPr id="6" name="Content Placeholder 2">
+            <a:extLst>
+              <a:ext uri="{FF2B5EF4-FFF2-40B4-BE49-F238E27FC236}">
+                <a16:creationId xmlns:a16="http://schemas.microsoft.com/office/drawing/2014/main" id="{96950C3E-FF14-ED4F-83CD-438F19A2DD83}"/>
+              </a:ext>
+            </a:extLst>
+          </p:cNvPr>
+          <p:cNvSpPr txBox="1">
+            <a:spLocks/>
+          </p:cNvSpPr>
+          <p:nvPr/>
+        </p:nvSpPr>
+        <p:spPr>
+          <a:xfrm>
+            <a:off x="838200" y="1333280"/>
+            <a:ext cx="8550349" cy="963353"/>
+          </a:xfrm>
+          <a:prstGeom prst="rect">
+            <a:avLst/>
+          </a:prstGeom>
+        </p:spPr>
+        <p:txBody>
+          <a:bodyPr vert="horz" lIns="91440" tIns="45720" rIns="91440" bIns="45720" rtlCol="0">
+            <a:normAutofit/>
+          </a:bodyPr>
+          <a:lstStyle>
+            <a:lvl1pPr marL="228600" indent="-228600" algn="l" defTabSz="914400" rtl="0" eaLnBrk="1" latinLnBrk="0" hangingPunct="1">
+              <a:lnSpc>
+                <a:spcPct val="90000"/>
+              </a:lnSpc>
+              <a:spcBef>
+                <a:spcPts val="1000"/>
+              </a:spcBef>
+              <a:buFont typeface="Arial" panose="020B0604020202020204" pitchFamily="34" charset="0"/>
+              <a:buChar char="•"/>
+              <a:defRPr sz="2800" kern="1200">
+                <a:solidFill>
+                  <a:schemeClr val="tx1"/>
+                </a:solidFill>
+                <a:latin typeface="+mn-lt"/>
+                <a:ea typeface="+mn-ea"/>
+                <a:cs typeface="+mn-cs"/>
+              </a:defRPr>
+            </a:lvl1pPr>
+            <a:lvl2pPr marL="685800" indent="-228600" algn="l" defTabSz="914400" rtl="0" eaLnBrk="1" latinLnBrk="0" hangingPunct="1">
+              <a:lnSpc>
+                <a:spcPct val="90000"/>
+              </a:lnSpc>
+              <a:spcBef>
+                <a:spcPts val="500"/>
+              </a:spcBef>
+              <a:buFont typeface="Arial" panose="020B0604020202020204" pitchFamily="34" charset="0"/>
+              <a:buChar char="•"/>
+              <a:defRPr sz="2400" kern="1200">
+                <a:solidFill>
+                  <a:schemeClr val="tx1"/>
+                </a:solidFill>
+                <a:latin typeface="+mn-lt"/>
+                <a:ea typeface="+mn-ea"/>
+                <a:cs typeface="+mn-cs"/>
+              </a:defRPr>
+            </a:lvl2pPr>
+            <a:lvl3pPr marL="1143000" indent="-228600" algn="l" defTabSz="914400" rtl="0" eaLnBrk="1" latinLnBrk="0" hangingPunct="1">
+              <a:lnSpc>
+                <a:spcPct val="90000"/>
+              </a:lnSpc>
+              <a:spcBef>
+                <a:spcPts val="500"/>
+              </a:spcBef>
+              <a:buFont typeface="Arial" panose="020B0604020202020204" pitchFamily="34" charset="0"/>
+              <a:buChar char="•"/>
+              <a:defRPr sz="2000" kern="1200">
+                <a:solidFill>
+                  <a:schemeClr val="tx1"/>
+                </a:solidFill>
+                <a:latin typeface="+mn-lt"/>
+                <a:ea typeface="+mn-ea"/>
+                <a:cs typeface="+mn-cs"/>
+              </a:defRPr>
+            </a:lvl3pPr>
+            <a:lvl4pPr marL="1600200" indent="-228600" algn="l" defTabSz="914400" rtl="0" eaLnBrk="1" latinLnBrk="0" hangingPunct="1">
+              <a:lnSpc>
+                <a:spcPct val="90000"/>
+              </a:lnSpc>
+              <a:spcBef>
+                <a:spcPts val="500"/>
+              </a:spcBef>
+              <a:buFont typeface="Arial" panose="020B0604020202020204" pitchFamily="34" charset="0"/>
+              <a:buChar char="•"/>
+              <a:defRPr sz="1800" kern="1200">
+                <a:solidFill>
+                  <a:schemeClr val="tx1"/>
+                </a:solidFill>
+                <a:latin typeface="+mn-lt"/>
+                <a:ea typeface="+mn-ea"/>
+                <a:cs typeface="+mn-cs"/>
+              </a:defRPr>
+            </a:lvl4pPr>
+            <a:lvl5pPr marL="2057400" indent="-228600" algn="l" defTabSz="914400" rtl="0" eaLnBrk="1" latinLnBrk="0" hangingPunct="1">
+              <a:lnSpc>
+                <a:spcPct val="90000"/>
+              </a:lnSpc>
+              <a:spcBef>
+                <a:spcPts val="500"/>
+              </a:spcBef>
+              <a:buFont typeface="Arial" panose="020B0604020202020204" pitchFamily="34" charset="0"/>
+              <a:buChar char="•"/>
+              <a:defRPr sz="1800" kern="1200">
+                <a:solidFill>
+                  <a:schemeClr val="tx1"/>
+                </a:solidFill>
+                <a:latin typeface="+mn-lt"/>
+                <a:ea typeface="+mn-ea"/>
+                <a:cs typeface="+mn-cs"/>
+              </a:defRPr>
+            </a:lvl5pPr>
+            <a:lvl6pPr marL="2514600" indent="-228600" algn="l" defTabSz="914400" rtl="0" eaLnBrk="1" latinLnBrk="0" hangingPunct="1">
+              <a:lnSpc>
+                <a:spcPct val="90000"/>
+              </a:lnSpc>
+              <a:spcBef>
+                <a:spcPts val="500"/>
+              </a:spcBef>
+              <a:buFont typeface="Arial" panose="020B0604020202020204" pitchFamily="34" charset="0"/>
+              <a:buChar char="•"/>
+              <a:defRPr sz="1800" kern="1200">
+                <a:solidFill>
+                  <a:schemeClr val="tx1"/>
+                </a:solidFill>
+                <a:latin typeface="+mn-lt"/>
+                <a:ea typeface="+mn-ea"/>
+                <a:cs typeface="+mn-cs"/>
+              </a:defRPr>
+            </a:lvl6pPr>
+            <a:lvl7pPr marL="2971800" indent="-228600" algn="l" defTabSz="914400" rtl="0" eaLnBrk="1" latinLnBrk="0" hangingPunct="1">
+              <a:lnSpc>
+                <a:spcPct val="90000"/>
+              </a:lnSpc>
+              <a:spcBef>
+                <a:spcPts val="500"/>
+              </a:spcBef>
+              <a:buFont typeface="Arial" panose="020B0604020202020204" pitchFamily="34" charset="0"/>
+              <a:buChar char="•"/>
+              <a:defRPr sz="1800" kern="1200">
+                <a:solidFill>
+                  <a:schemeClr val="tx1"/>
+                </a:solidFill>
+                <a:latin typeface="+mn-lt"/>
+                <a:ea typeface="+mn-ea"/>
+                <a:cs typeface="+mn-cs"/>
+              </a:defRPr>
+            </a:lvl7pPr>
+            <a:lvl8pPr marL="3429000" indent="-228600" algn="l" defTabSz="914400" rtl="0" eaLnBrk="1" latinLnBrk="0" hangingPunct="1">
+              <a:lnSpc>
+                <a:spcPct val="90000"/>
+              </a:lnSpc>
+              <a:spcBef>
+                <a:spcPts val="500"/>
+              </a:spcBef>
+              <a:buFont typeface="Arial" panose="020B0604020202020204" pitchFamily="34" charset="0"/>
+              <a:buChar char="•"/>
+              <a:defRPr sz="1800" kern="1200">
+                <a:solidFill>
+                  <a:schemeClr val="tx1"/>
+                </a:solidFill>
+                <a:latin typeface="+mn-lt"/>
+                <a:ea typeface="+mn-ea"/>
+                <a:cs typeface="+mn-cs"/>
+              </a:defRPr>
+            </a:lvl8pPr>
+            <a:lvl9pPr marL="3886200" indent="-228600" algn="l" defTabSz="914400" rtl="0" eaLnBrk="1" latinLnBrk="0" hangingPunct="1">
+              <a:lnSpc>
+                <a:spcPct val="90000"/>
+              </a:lnSpc>
+              <a:spcBef>
+                <a:spcPts val="500"/>
+              </a:spcBef>
+              <a:buFont typeface="Arial" panose="020B0604020202020204" pitchFamily="34" charset="0"/>
+              <a:buChar char="•"/>
+              <a:defRPr sz="1800" kern="1200">
+                <a:solidFill>
+                  <a:schemeClr val="tx1"/>
+                </a:solidFill>
+                <a:latin typeface="+mn-lt"/>
+                <a:ea typeface="+mn-ea"/>
+                <a:cs typeface="+mn-cs"/>
+              </a:defRPr>
+            </a:lvl9pPr>
+          </a:lstStyle>
+          <a:p>
+            <a:pPr marL="0" indent="0">
+              <a:buNone/>
             </a:pPr>
             <a:r>
-              <a:rPr lang="en-US" dirty="0"/>
-              <a:t> import `React` and `</a:t>
-            </a:r>
-            <a:r>
-              <a:rPr lang="en-US" dirty="0" err="1"/>
-              <a:t>ReactDOM</a:t>
-            </a:r>
-            <a:r>
-              <a:rPr lang="en-US" dirty="0"/>
-              <a:t>` and use the latter to render a heading that says “Hello React!”</a:t>
-            </a:r>
-            <a:endParaRPr lang="en-US" sz="2800" dirty="0"/>
-          </a:p>
-          <a:p>
-            <a:pPr>
-              <a:buFont typeface="Wingdings" pitchFamily="2" charset="2"/>
-              <a:buChar char="Ø"/>
-            </a:pPr>
-            <a:r>
-              <a:rPr lang="en-US" dirty="0"/>
-              <a:t>Create a components folder in the browser folder.</a:t>
-            </a:r>
-          </a:p>
-          <a:p>
-            <a:pPr>
-              <a:buFont typeface="Wingdings" pitchFamily="2" charset="2"/>
-              <a:buChar char="Ø"/>
-            </a:pPr>
-            <a:r>
-              <a:rPr lang="en-US" dirty="0"/>
-              <a:t>In that new components folder, create a &lt;Main&gt; component that fetches a list of all students from the server. It should render a table of students with one column, the student’s full name</a:t>
-            </a:r>
-          </a:p>
-          <a:p>
-            <a:pPr>
-              <a:buFont typeface="Wingdings" pitchFamily="2" charset="2"/>
-              <a:buChar char="Ø"/>
-            </a:pPr>
-            <a:r>
-              <a:rPr lang="en-US" dirty="0"/>
-              <a:t>Review at 1:00pm</a:t>
+              <a:rPr lang="en-US" i="1" dirty="0"/>
+              <a:t>End Goal is to show list of all the students that are stored in the DB</a:t>
             </a:r>
           </a:p>
         </p:txBody>
@@ -3757,43 +4014,50 @@
             <p:ph type="title"/>
           </p:nvPr>
         </p:nvSpPr>
-        <p:spPr/>
-        <p:txBody>
-          <a:bodyPr/>
-          <a:lstStyle/>
-          <a:p>
-            <a:r>
-              <a:rPr lang="en-US" dirty="0"/>
-              <a:t>Cycle-2 : Shows Students Tests</a:t>
-            </a:r>
-          </a:p>
-        </p:txBody>
-      </p:sp>
-      <p:sp>
-        <p:nvSpPr>
-          <p:cNvPr id="3" name="Content Placeholder 2">
-            <a:extLst>
-              <a:ext uri="{FF2B5EF4-FFF2-40B4-BE49-F238E27FC236}">
-                <a16:creationId xmlns:a16="http://schemas.microsoft.com/office/drawing/2014/main" id="{D732B538-3036-7144-A3B3-13858BAE5C52}"/>
-              </a:ext>
-            </a:extLst>
-          </p:cNvPr>
-          <p:cNvSpPr>
-            <a:spLocks noGrp="1"/>
-          </p:cNvSpPr>
-          <p:nvPr>
-            <p:ph idx="1"/>
-          </p:nvPr>
-        </p:nvSpPr>
         <p:spPr>
           <a:xfrm>
-            <a:off x="838200" y="2371059"/>
-            <a:ext cx="10515600" cy="3805903"/>
+            <a:off x="838200" y="365126"/>
+            <a:ext cx="10515600" cy="655638"/>
           </a:xfrm>
         </p:spPr>
         <p:txBody>
           <a:bodyPr>
-            <a:normAutofit/>
+            <a:normAutofit fontScale="90000"/>
+          </a:bodyPr>
+          <a:lstStyle/>
+          <a:p>
+            <a:r>
+              <a:rPr lang="en-US" dirty="0"/>
+              <a:t>Cycle-2 : Shows Individual Student’s Details</a:t>
+            </a:r>
+          </a:p>
+        </p:txBody>
+      </p:sp>
+      <p:sp>
+        <p:nvSpPr>
+          <p:cNvPr id="3" name="Content Placeholder 2">
+            <a:extLst>
+              <a:ext uri="{FF2B5EF4-FFF2-40B4-BE49-F238E27FC236}">
+                <a16:creationId xmlns:a16="http://schemas.microsoft.com/office/drawing/2014/main" id="{D732B538-3036-7144-A3B3-13858BAE5C52}"/>
+              </a:ext>
+            </a:extLst>
+          </p:cNvPr>
+          <p:cNvSpPr>
+            <a:spLocks noGrp="1"/>
+          </p:cNvSpPr>
+          <p:nvPr>
+            <p:ph idx="1"/>
+          </p:nvPr>
+        </p:nvSpPr>
+        <p:spPr>
+          <a:xfrm>
+            <a:off x="838200" y="1998922"/>
+            <a:ext cx="8316433" cy="4582078"/>
+          </a:xfrm>
+        </p:spPr>
+        <p:txBody>
+          <a:bodyPr>
+            <a:normAutofit lnSpcReduction="10000"/>
           </a:bodyPr>
           <a:lstStyle/>
           <a:p>
@@ -3803,7 +4067,85 @@
             </a:pPr>
             <a:r>
               <a:rPr lang="en-US" dirty="0"/>
+              <a:t>To start  </a:t>
+            </a:r>
+            <a:r>
+              <a:rPr lang="en-US"/>
+              <a:t>checkout cycle-2 </a:t>
+            </a:r>
+            <a:r>
+              <a:rPr lang="en-US" dirty="0"/>
+              <a:t>branch: </a:t>
+            </a:r>
+            <a:r>
+              <a:rPr lang="en-US" i="1" dirty="0"/>
+              <a:t>git checkout cycle-2</a:t>
+            </a:r>
+          </a:p>
+          <a:p>
+            <a:pPr marL="0" indent="0">
+              <a:buNone/>
+            </a:pPr>
+            <a:r>
+              <a:rPr lang="en-US" i="1" dirty="0"/>
+              <a:t>Instructions:</a:t>
+            </a:r>
+            <a:endParaRPr lang="en-US" dirty="0"/>
+          </a:p>
+          <a:p>
+            <a:pPr lvl="1">
+              <a:buFont typeface="Wingdings" pitchFamily="2" charset="2"/>
+              <a:buChar char="Ø"/>
+            </a:pPr>
+            <a:r>
+              <a:rPr lang="en-US" dirty="0"/>
+              <a:t>Create </a:t>
+            </a:r>
+            <a:r>
+              <a:rPr lang="en-US" dirty="0" err="1"/>
+              <a:t>StudentList.js</a:t>
+            </a:r>
+            <a:r>
+              <a:rPr lang="en-US" dirty="0"/>
+              <a:t> component which will map and render each student.</a:t>
+            </a:r>
+          </a:p>
+          <a:p>
+            <a:pPr lvl="1">
+              <a:buFont typeface="Wingdings" pitchFamily="2" charset="2"/>
+              <a:buChar char="Ø"/>
+            </a:pPr>
+            <a:r>
+              <a:rPr lang="en-US" dirty="0"/>
               <a:t>Add a second column to the table.</a:t>
+            </a:r>
+          </a:p>
+          <a:p>
+            <a:pPr lvl="1">
+              <a:buFont typeface="Wingdings" pitchFamily="2" charset="2"/>
+              <a:buChar char="Ø"/>
+            </a:pPr>
+            <a:r>
+              <a:rPr lang="en-US" dirty="0"/>
+              <a:t>In the second column, add a word like “Details”, that, when clicked, renders all of that student’s test scores below the table</a:t>
+            </a:r>
+          </a:p>
+          <a:p>
+            <a:pPr lvl="1">
+              <a:buFont typeface="Wingdings" pitchFamily="2" charset="2"/>
+              <a:buChar char="Ø"/>
+            </a:pPr>
+            <a:r>
+              <a:rPr lang="en-US" dirty="0"/>
+              <a:t>Create </a:t>
+            </a:r>
+            <a:r>
+              <a:rPr lang="en-US" dirty="0" err="1"/>
+              <a:t>SingleStudent.js</a:t>
+            </a:r>
+            <a:r>
+              <a:rPr lang="en-US" dirty="0"/>
+              <a:t> component which will show students name and average score along with each test and grade</a:t>
             </a:r>
           </a:p>
           <a:p>
@@ -3811,32 +4153,249 @@
               <a:buFont typeface="Wingdings" pitchFamily="2" charset="2"/>
               <a:buChar char="Ø"/>
             </a:pPr>
-            <a:endParaRPr lang="en-US" dirty="0"/>
-          </a:p>
-          <a:p>
-            <a:pPr>
-              <a:buFont typeface="Wingdings" pitchFamily="2" charset="2"/>
-              <a:buChar char="Ø"/>
-            </a:pPr>
-            <a:r>
-              <a:rPr lang="en-US" dirty="0"/>
-              <a:t> In the second column, add a word like “Details”, that, when clicked, renders all of that student’s test scores below the table</a:t>
-            </a:r>
-          </a:p>
-          <a:p>
-            <a:pPr marL="0" indent="0">
-              <a:buNone/>
-            </a:pPr>
-            <a:endParaRPr lang="en-US" dirty="0"/>
-          </a:p>
-          <a:p>
-            <a:pPr>
-              <a:buFont typeface="Wingdings" pitchFamily="2" charset="2"/>
-              <a:buChar char="Ø"/>
-            </a:pPr>
             <a:r>
               <a:rPr lang="en-US" dirty="0"/>
               <a:t>Review at 3:30pm</a:t>
+            </a:r>
+          </a:p>
+        </p:txBody>
+      </p:sp>
+      <p:pic>
+        <p:nvPicPr>
+          <p:cNvPr id="6" name="Picture 5">
+            <a:extLst>
+              <a:ext uri="{FF2B5EF4-FFF2-40B4-BE49-F238E27FC236}">
+                <a16:creationId xmlns:a16="http://schemas.microsoft.com/office/drawing/2014/main" id="{FA2B4841-3DA3-8E44-B6FD-195A565ACD18}"/>
+              </a:ext>
+            </a:extLst>
+          </p:cNvPr>
+          <p:cNvPicPr>
+            <a:picLocks noChangeAspect="1"/>
+          </p:cNvPicPr>
+          <p:nvPr/>
+        </p:nvPicPr>
+        <p:blipFill>
+          <a:blip r:embed="rId2"/>
+          <a:stretch>
+            <a:fillRect/>
+          </a:stretch>
+        </p:blipFill>
+        <p:spPr>
+          <a:xfrm>
+            <a:off x="9419269" y="1020763"/>
+            <a:ext cx="2540000" cy="5156200"/>
+          </a:xfrm>
+          <a:prstGeom prst="rect">
+            <a:avLst/>
+          </a:prstGeom>
+          <a:ln w="19050">
+            <a:solidFill>
+              <a:schemeClr val="accent1">
+                <a:lumMod val="60000"/>
+                <a:lumOff val="40000"/>
+              </a:schemeClr>
+            </a:solidFill>
+          </a:ln>
+        </p:spPr>
+      </p:pic>
+      <p:sp>
+        <p:nvSpPr>
+          <p:cNvPr id="5" name="Content Placeholder 2">
+            <a:extLst>
+              <a:ext uri="{FF2B5EF4-FFF2-40B4-BE49-F238E27FC236}">
+                <a16:creationId xmlns:a16="http://schemas.microsoft.com/office/drawing/2014/main" id="{EB8BBF4E-73C8-344D-82F8-2DA97A7E6086}"/>
+              </a:ext>
+            </a:extLst>
+          </p:cNvPr>
+          <p:cNvSpPr txBox="1">
+            <a:spLocks/>
+          </p:cNvSpPr>
+          <p:nvPr/>
+        </p:nvSpPr>
+        <p:spPr>
+          <a:xfrm>
+            <a:off x="838200" y="1020762"/>
+            <a:ext cx="8656674" cy="978159"/>
+          </a:xfrm>
+          <a:prstGeom prst="rect">
+            <a:avLst/>
+          </a:prstGeom>
+        </p:spPr>
+        <p:txBody>
+          <a:bodyPr vert="horz" lIns="91440" tIns="45720" rIns="91440" bIns="45720" rtlCol="0">
+            <a:normAutofit fontScale="92500"/>
+          </a:bodyPr>
+          <a:lstStyle>
+            <a:lvl1pPr marL="228600" indent="-228600" algn="l" defTabSz="914400" rtl="0" eaLnBrk="1" latinLnBrk="0" hangingPunct="1">
+              <a:lnSpc>
+                <a:spcPct val="90000"/>
+              </a:lnSpc>
+              <a:spcBef>
+                <a:spcPts val="1000"/>
+              </a:spcBef>
+              <a:buFont typeface="Arial" panose="020B0604020202020204" pitchFamily="34" charset="0"/>
+              <a:buChar char="•"/>
+              <a:defRPr sz="2800" kern="1200">
+                <a:solidFill>
+                  <a:schemeClr val="tx1"/>
+                </a:solidFill>
+                <a:latin typeface="+mn-lt"/>
+                <a:ea typeface="+mn-ea"/>
+                <a:cs typeface="+mn-cs"/>
+              </a:defRPr>
+            </a:lvl1pPr>
+            <a:lvl2pPr marL="685800" indent="-228600" algn="l" defTabSz="914400" rtl="0" eaLnBrk="1" latinLnBrk="0" hangingPunct="1">
+              <a:lnSpc>
+                <a:spcPct val="90000"/>
+              </a:lnSpc>
+              <a:spcBef>
+                <a:spcPts val="500"/>
+              </a:spcBef>
+              <a:buFont typeface="Arial" panose="020B0604020202020204" pitchFamily="34" charset="0"/>
+              <a:buChar char="•"/>
+              <a:defRPr sz="2400" kern="1200">
+                <a:solidFill>
+                  <a:schemeClr val="tx1"/>
+                </a:solidFill>
+                <a:latin typeface="+mn-lt"/>
+                <a:ea typeface="+mn-ea"/>
+                <a:cs typeface="+mn-cs"/>
+              </a:defRPr>
+            </a:lvl2pPr>
+            <a:lvl3pPr marL="1143000" indent="-228600" algn="l" defTabSz="914400" rtl="0" eaLnBrk="1" latinLnBrk="0" hangingPunct="1">
+              <a:lnSpc>
+                <a:spcPct val="90000"/>
+              </a:lnSpc>
+              <a:spcBef>
+                <a:spcPts val="500"/>
+              </a:spcBef>
+              <a:buFont typeface="Arial" panose="020B0604020202020204" pitchFamily="34" charset="0"/>
+              <a:buChar char="•"/>
+              <a:defRPr sz="2000" kern="1200">
+                <a:solidFill>
+                  <a:schemeClr val="tx1"/>
+                </a:solidFill>
+                <a:latin typeface="+mn-lt"/>
+                <a:ea typeface="+mn-ea"/>
+                <a:cs typeface="+mn-cs"/>
+              </a:defRPr>
+            </a:lvl3pPr>
+            <a:lvl4pPr marL="1600200" indent="-228600" algn="l" defTabSz="914400" rtl="0" eaLnBrk="1" latinLnBrk="0" hangingPunct="1">
+              <a:lnSpc>
+                <a:spcPct val="90000"/>
+              </a:lnSpc>
+              <a:spcBef>
+                <a:spcPts val="500"/>
+              </a:spcBef>
+              <a:buFont typeface="Arial" panose="020B0604020202020204" pitchFamily="34" charset="0"/>
+              <a:buChar char="•"/>
+              <a:defRPr sz="1800" kern="1200">
+                <a:solidFill>
+                  <a:schemeClr val="tx1"/>
+                </a:solidFill>
+                <a:latin typeface="+mn-lt"/>
+                <a:ea typeface="+mn-ea"/>
+                <a:cs typeface="+mn-cs"/>
+              </a:defRPr>
+            </a:lvl4pPr>
+            <a:lvl5pPr marL="2057400" indent="-228600" algn="l" defTabSz="914400" rtl="0" eaLnBrk="1" latinLnBrk="0" hangingPunct="1">
+              <a:lnSpc>
+                <a:spcPct val="90000"/>
+              </a:lnSpc>
+              <a:spcBef>
+                <a:spcPts val="500"/>
+              </a:spcBef>
+              <a:buFont typeface="Arial" panose="020B0604020202020204" pitchFamily="34" charset="0"/>
+              <a:buChar char="•"/>
+              <a:defRPr sz="1800" kern="1200">
+                <a:solidFill>
+                  <a:schemeClr val="tx1"/>
+                </a:solidFill>
+                <a:latin typeface="+mn-lt"/>
+                <a:ea typeface="+mn-ea"/>
+                <a:cs typeface="+mn-cs"/>
+              </a:defRPr>
+            </a:lvl5pPr>
+            <a:lvl6pPr marL="2514600" indent="-228600" algn="l" defTabSz="914400" rtl="0" eaLnBrk="1" latinLnBrk="0" hangingPunct="1">
+              <a:lnSpc>
+                <a:spcPct val="90000"/>
+              </a:lnSpc>
+              <a:spcBef>
+                <a:spcPts val="500"/>
+              </a:spcBef>
+              <a:buFont typeface="Arial" panose="020B0604020202020204" pitchFamily="34" charset="0"/>
+              <a:buChar char="•"/>
+              <a:defRPr sz="1800" kern="1200">
+                <a:solidFill>
+                  <a:schemeClr val="tx1"/>
+                </a:solidFill>
+                <a:latin typeface="+mn-lt"/>
+                <a:ea typeface="+mn-ea"/>
+                <a:cs typeface="+mn-cs"/>
+              </a:defRPr>
+            </a:lvl6pPr>
+            <a:lvl7pPr marL="2971800" indent="-228600" algn="l" defTabSz="914400" rtl="0" eaLnBrk="1" latinLnBrk="0" hangingPunct="1">
+              <a:lnSpc>
+                <a:spcPct val="90000"/>
+              </a:lnSpc>
+              <a:spcBef>
+                <a:spcPts val="500"/>
+              </a:spcBef>
+              <a:buFont typeface="Arial" panose="020B0604020202020204" pitchFamily="34" charset="0"/>
+              <a:buChar char="•"/>
+              <a:defRPr sz="1800" kern="1200">
+                <a:solidFill>
+                  <a:schemeClr val="tx1"/>
+                </a:solidFill>
+                <a:latin typeface="+mn-lt"/>
+                <a:ea typeface="+mn-ea"/>
+                <a:cs typeface="+mn-cs"/>
+              </a:defRPr>
+            </a:lvl7pPr>
+            <a:lvl8pPr marL="3429000" indent="-228600" algn="l" defTabSz="914400" rtl="0" eaLnBrk="1" latinLnBrk="0" hangingPunct="1">
+              <a:lnSpc>
+                <a:spcPct val="90000"/>
+              </a:lnSpc>
+              <a:spcBef>
+                <a:spcPts val="500"/>
+              </a:spcBef>
+              <a:buFont typeface="Arial" panose="020B0604020202020204" pitchFamily="34" charset="0"/>
+              <a:buChar char="•"/>
+              <a:defRPr sz="1800" kern="1200">
+                <a:solidFill>
+                  <a:schemeClr val="tx1"/>
+                </a:solidFill>
+                <a:latin typeface="+mn-lt"/>
+                <a:ea typeface="+mn-ea"/>
+                <a:cs typeface="+mn-cs"/>
+              </a:defRPr>
+            </a:lvl8pPr>
+            <a:lvl9pPr marL="3886200" indent="-228600" algn="l" defTabSz="914400" rtl="0" eaLnBrk="1" latinLnBrk="0" hangingPunct="1">
+              <a:lnSpc>
+                <a:spcPct val="90000"/>
+              </a:lnSpc>
+              <a:spcBef>
+                <a:spcPts val="500"/>
+              </a:spcBef>
+              <a:buFont typeface="Arial" panose="020B0604020202020204" pitchFamily="34" charset="0"/>
+              <a:buChar char="•"/>
+              <a:defRPr sz="1800" kern="1200">
+                <a:solidFill>
+                  <a:schemeClr val="tx1"/>
+                </a:solidFill>
+                <a:latin typeface="+mn-lt"/>
+                <a:ea typeface="+mn-ea"/>
+                <a:cs typeface="+mn-cs"/>
+              </a:defRPr>
+            </a:lvl9pPr>
+          </a:lstStyle>
+          <a:p>
+            <a:pPr marL="0" indent="0">
+              <a:buNone/>
+            </a:pPr>
+            <a:r>
+              <a:rPr lang="en-US" dirty="0"/>
+              <a:t>End Goal: to shows students first name, last name , average grade and each subject grade once you click on the details link</a:t>
             </a:r>
           </a:p>
         </p:txBody>

</xml_diff>